<commit_message>
changing logos, icon, banner graphic
</commit_message>
<xml_diff>
--- a/docs/dipnetWorkflow.pptx
+++ b/docs/dipnetWorkflow.pptx
@@ -243,7 +243,7 @@
           <a:p>
             <a:fld id="{FF6C7326-2AF8-734F-A684-D3076EFEC837}" type="datetimeFigureOut">
               <a:rPr lang="en-US" smtClean="0"/>
-              <a:t>11/9/16</a:t>
+              <a:t>5/4/17</a:t>
             </a:fld>
             <a:endParaRPr lang="en-US"/>
           </a:p>
@@ -413,7 +413,7 @@
           <a:p>
             <a:fld id="{FF6C7326-2AF8-734F-A684-D3076EFEC837}" type="datetimeFigureOut">
               <a:rPr lang="en-US" smtClean="0"/>
-              <a:t>11/9/16</a:t>
+              <a:t>5/4/17</a:t>
             </a:fld>
             <a:endParaRPr lang="en-US"/>
           </a:p>
@@ -593,7 +593,7 @@
           <a:p>
             <a:fld id="{FF6C7326-2AF8-734F-A684-D3076EFEC837}" type="datetimeFigureOut">
               <a:rPr lang="en-US" smtClean="0"/>
-              <a:t>11/9/16</a:t>
+              <a:t>5/4/17</a:t>
             </a:fld>
             <a:endParaRPr lang="en-US"/>
           </a:p>
@@ -763,7 +763,7 @@
           <a:p>
             <a:fld id="{FF6C7326-2AF8-734F-A684-D3076EFEC837}" type="datetimeFigureOut">
               <a:rPr lang="en-US" smtClean="0"/>
-              <a:t>11/9/16</a:t>
+              <a:t>5/4/17</a:t>
             </a:fld>
             <a:endParaRPr lang="en-US"/>
           </a:p>
@@ -1009,7 +1009,7 @@
           <a:p>
             <a:fld id="{FF6C7326-2AF8-734F-A684-D3076EFEC837}" type="datetimeFigureOut">
               <a:rPr lang="en-US" smtClean="0"/>
-              <a:t>11/9/16</a:t>
+              <a:t>5/4/17</a:t>
             </a:fld>
             <a:endParaRPr lang="en-US"/>
           </a:p>
@@ -1241,7 +1241,7 @@
           <a:p>
             <a:fld id="{FF6C7326-2AF8-734F-A684-D3076EFEC837}" type="datetimeFigureOut">
               <a:rPr lang="en-US" smtClean="0"/>
-              <a:t>11/9/16</a:t>
+              <a:t>5/4/17</a:t>
             </a:fld>
             <a:endParaRPr lang="en-US"/>
           </a:p>
@@ -1608,7 +1608,7 @@
           <a:p>
             <a:fld id="{FF6C7326-2AF8-734F-A684-D3076EFEC837}" type="datetimeFigureOut">
               <a:rPr lang="en-US" smtClean="0"/>
-              <a:t>11/9/16</a:t>
+              <a:t>5/4/17</a:t>
             </a:fld>
             <a:endParaRPr lang="en-US"/>
           </a:p>
@@ -1726,7 +1726,7 @@
           <a:p>
             <a:fld id="{FF6C7326-2AF8-734F-A684-D3076EFEC837}" type="datetimeFigureOut">
               <a:rPr lang="en-US" smtClean="0"/>
-              <a:t>11/9/16</a:t>
+              <a:t>5/4/17</a:t>
             </a:fld>
             <a:endParaRPr lang="en-US"/>
           </a:p>
@@ -1821,7 +1821,7 @@
           <a:p>
             <a:fld id="{FF6C7326-2AF8-734F-A684-D3076EFEC837}" type="datetimeFigureOut">
               <a:rPr lang="en-US" smtClean="0"/>
-              <a:t>11/9/16</a:t>
+              <a:t>5/4/17</a:t>
             </a:fld>
             <a:endParaRPr lang="en-US"/>
           </a:p>
@@ -2098,7 +2098,7 @@
           <a:p>
             <a:fld id="{FF6C7326-2AF8-734F-A684-D3076EFEC837}" type="datetimeFigureOut">
               <a:rPr lang="en-US" smtClean="0"/>
-              <a:t>11/9/16</a:t>
+              <a:t>5/4/17</a:t>
             </a:fld>
             <a:endParaRPr lang="en-US"/>
           </a:p>
@@ -2351,7 +2351,7 @@
           <a:p>
             <a:fld id="{FF6C7326-2AF8-734F-A684-D3076EFEC837}" type="datetimeFigureOut">
               <a:rPr lang="en-US" smtClean="0"/>
-              <a:t>11/9/16</a:t>
+              <a:t>5/4/17</a:t>
             </a:fld>
             <a:endParaRPr lang="en-US"/>
           </a:p>
@@ -2564,7 +2564,7 @@
           <a:p>
             <a:fld id="{FF6C7326-2AF8-734F-A684-D3076EFEC837}" type="datetimeFigureOut">
               <a:rPr lang="en-US" smtClean="0"/>
-              <a:t>11/9/16</a:t>
+              <a:t>5/4/17</a:t>
             </a:fld>
             <a:endParaRPr lang="en-US"/>
           </a:p>
@@ -3007,13 +3007,8 @@
             <a:pPr algn="ctr"/>
             <a:r>
               <a:rPr lang="en-US" dirty="0" smtClean="0"/>
-              <a:t>Generate </a:t>
-            </a:r>
-            <a:r>
-              <a:rPr lang="en-US" dirty="0" smtClean="0"/>
-              <a:t>Spreadsheet Template </a:t>
-            </a:r>
-            <a:endParaRPr lang="en-US" dirty="0" smtClean="0"/>
+              <a:t>Generate Spreadsheet Template </a:t>
+            </a:r>
           </a:p>
         </p:txBody>
       </p:sp>
@@ -3101,7 +3096,7 @@
             </a:r>
             <a:r>
               <a:rPr lang="en-US" dirty="0" smtClean="0"/>
-              <a:t>Data into DIPNET Index</a:t>
+              <a:t>Data</a:t>
             </a:r>
             <a:endParaRPr lang="en-US" dirty="0"/>
           </a:p>
@@ -3308,13 +3303,8 @@
             <a:pPr algn="ctr"/>
             <a:r>
               <a:rPr lang="en-US" dirty="0" smtClean="0"/>
-              <a:t>Sequence Read </a:t>
-            </a:r>
-            <a:r>
-              <a:rPr lang="en-US" dirty="0" smtClean="0"/>
-              <a:t>Archive</a:t>
-            </a:r>
-            <a:endParaRPr lang="en-US" dirty="0" smtClean="0"/>
+              <a:t>Sequence Read Archive</a:t>
+            </a:r>
           </a:p>
         </p:txBody>
       </p:sp>
@@ -3327,7 +3317,7 @@
         <p:spPr>
           <a:xfrm>
             <a:off x="515924" y="5814656"/>
-            <a:ext cx="3496336" cy="381250"/>
+            <a:ext cx="2558656" cy="381250"/>
           </a:xfrm>
           <a:prstGeom prst="roundRect">
             <a:avLst/>
@@ -3353,8 +3343,8 @@
           <a:p>
             <a:pPr algn="ctr"/>
             <a:r>
-              <a:rPr lang="en-US" dirty="0" smtClean="0"/>
-              <a:t>Components outside of FIMS</a:t>
+              <a:rPr lang="en-US" smtClean="0"/>
+              <a:t>External Components</a:t>
             </a:r>
             <a:endParaRPr lang="en-US" dirty="0"/>
           </a:p>
@@ -3369,7 +3359,7 @@
         <p:spPr>
           <a:xfrm>
             <a:off x="511129" y="5366249"/>
-            <a:ext cx="3496336" cy="381250"/>
+            <a:ext cx="2563451" cy="381250"/>
           </a:xfrm>
           <a:prstGeom prst="roundRect">
             <a:avLst/>
@@ -3401,12 +3391,8 @@
               <a:t>User-level </a:t>
             </a:r>
             <a:r>
-              <a:rPr lang="en-US" dirty="0" err="1" smtClean="0"/>
-              <a:t>DIPnet</a:t>
-            </a:r>
-            <a:r>
               <a:rPr lang="en-US" dirty="0" smtClean="0"/>
-              <a:t> FIMS Functions</a:t>
+              <a:t>Functions</a:t>
             </a:r>
             <a:endParaRPr lang="en-US" dirty="0"/>
           </a:p>
@@ -3421,7 +3407,7 @@
         <p:spPr>
           <a:xfrm>
             <a:off x="4165055" y="634891"/>
-            <a:ext cx="3893374" cy="584775"/>
+            <a:ext cx="3154966" cy="584775"/>
           </a:xfrm>
           <a:prstGeom prst="rect">
             <a:avLst/>
@@ -3438,13 +3424,13 @@
               <a:rPr lang="en-US" sz="3200" b="1" dirty="0" err="1" smtClean="0">
                 <a:latin typeface="+mj-lt"/>
               </a:rPr>
-              <a:t>DIPnet</a:t>
+              <a:t>GeOMe</a:t>
             </a:r>
             <a:r>
               <a:rPr lang="en-US" sz="3200" b="1" dirty="0" smtClean="0">
                 <a:latin typeface="+mj-lt"/>
               </a:rPr>
-              <a:t> FIMS Workflow</a:t>
+              <a:t> Workflow</a:t>
             </a:r>
             <a:endParaRPr lang="en-US" sz="3200" b="1" dirty="0">
               <a:latin typeface="+mj-lt"/>
@@ -3532,7 +3518,7 @@
             <a:pPr algn="ctr"/>
             <a:r>
               <a:rPr lang="en-US" dirty="0" smtClean="0"/>
-              <a:t>DIPNET Query Pages</a:t>
+              <a:t>Query Interface</a:t>
             </a:r>
             <a:endParaRPr lang="en-US" dirty="0"/>
           </a:p>
@@ -3804,7 +3790,6 @@
               <a:rPr lang="en-US" i="1" dirty="0"/>
               <a:t>User submission</a:t>
             </a:r>
-            <a:endParaRPr lang="en-US" i="1" dirty="0"/>
           </a:p>
         </p:txBody>
       </p:sp>

</xml_diff>